<commit_message>
Update 31st October 2024
</commit_message>
<xml_diff>
--- a/Misc/GDP1 Mission Patch Design.pptx
+++ b/Misc/GDP1 Mission Patch Design.pptx
@@ -6,6 +6,9 @@
   </p:sldMasterIdLst>
   <p:sldIdLst>
     <p:sldId id="256" r:id="rId2"/>
+    <p:sldId id="259" r:id="rId3"/>
+    <p:sldId id="258" r:id="rId4"/>
+    <p:sldId id="257" r:id="rId5"/>
   </p:sldIdLst>
   <p:sldSz cx="12192000" cy="6858000"/>
   <p:notesSz cx="6858000" cy="9144000"/>
@@ -104,6 +107,11 @@
       </a:defRPr>
     </a:lvl9pPr>
   </p:defaultTextStyle>
+  <p:extLst>
+    <p:ext uri="{EFAFB233-063F-42B5-8137-9DF3F51BA10A}">
+      <p15:sldGuideLst xmlns:p15="http://schemas.microsoft.com/office/powerpoint/2012/main"/>
+    </p:ext>
+  </p:extLst>
 </p:presentation>
 </file>
 
@@ -256,7 +264,7 @@
           <a:p>
             <a:fld id="{EAA3A8BB-77FD-4B0C-9729-5723AE9AFB2D}" type="datetimeFigureOut">
               <a:rPr lang="en-GB" smtClean="0"/>
-              <a:t>22/10/2024</a:t>
+              <a:t>31/10/2024</a:t>
             </a:fld>
             <a:endParaRPr lang="en-GB"/>
           </a:p>
@@ -456,7 +464,7 @@
           <a:p>
             <a:fld id="{EAA3A8BB-77FD-4B0C-9729-5723AE9AFB2D}" type="datetimeFigureOut">
               <a:rPr lang="en-GB" smtClean="0"/>
-              <a:t>22/10/2024</a:t>
+              <a:t>31/10/2024</a:t>
             </a:fld>
             <a:endParaRPr lang="en-GB"/>
           </a:p>
@@ -666,7 +674,7 @@
           <a:p>
             <a:fld id="{EAA3A8BB-77FD-4B0C-9729-5723AE9AFB2D}" type="datetimeFigureOut">
               <a:rPr lang="en-GB" smtClean="0"/>
-              <a:t>22/10/2024</a:t>
+              <a:t>31/10/2024</a:t>
             </a:fld>
             <a:endParaRPr lang="en-GB"/>
           </a:p>
@@ -866,7 +874,7 @@
           <a:p>
             <a:fld id="{EAA3A8BB-77FD-4B0C-9729-5723AE9AFB2D}" type="datetimeFigureOut">
               <a:rPr lang="en-GB" smtClean="0"/>
-              <a:t>22/10/2024</a:t>
+              <a:t>31/10/2024</a:t>
             </a:fld>
             <a:endParaRPr lang="en-GB"/>
           </a:p>
@@ -1142,7 +1150,7 @@
           <a:p>
             <a:fld id="{EAA3A8BB-77FD-4B0C-9729-5723AE9AFB2D}" type="datetimeFigureOut">
               <a:rPr lang="en-GB" smtClean="0"/>
-              <a:t>22/10/2024</a:t>
+              <a:t>31/10/2024</a:t>
             </a:fld>
             <a:endParaRPr lang="en-GB"/>
           </a:p>
@@ -1410,7 +1418,7 @@
           <a:p>
             <a:fld id="{EAA3A8BB-77FD-4B0C-9729-5723AE9AFB2D}" type="datetimeFigureOut">
               <a:rPr lang="en-GB" smtClean="0"/>
-              <a:t>22/10/2024</a:t>
+              <a:t>31/10/2024</a:t>
             </a:fld>
             <a:endParaRPr lang="en-GB"/>
           </a:p>
@@ -1825,7 +1833,7 @@
           <a:p>
             <a:fld id="{EAA3A8BB-77FD-4B0C-9729-5723AE9AFB2D}" type="datetimeFigureOut">
               <a:rPr lang="en-GB" smtClean="0"/>
-              <a:t>22/10/2024</a:t>
+              <a:t>31/10/2024</a:t>
             </a:fld>
             <a:endParaRPr lang="en-GB"/>
           </a:p>
@@ -1967,7 +1975,7 @@
           <a:p>
             <a:fld id="{EAA3A8BB-77FD-4B0C-9729-5723AE9AFB2D}" type="datetimeFigureOut">
               <a:rPr lang="en-GB" smtClean="0"/>
-              <a:t>22/10/2024</a:t>
+              <a:t>31/10/2024</a:t>
             </a:fld>
             <a:endParaRPr lang="en-GB"/>
           </a:p>
@@ -2080,7 +2088,7 @@
           <a:p>
             <a:fld id="{EAA3A8BB-77FD-4B0C-9729-5723AE9AFB2D}" type="datetimeFigureOut">
               <a:rPr lang="en-GB" smtClean="0"/>
-              <a:t>22/10/2024</a:t>
+              <a:t>31/10/2024</a:t>
             </a:fld>
             <a:endParaRPr lang="en-GB"/>
           </a:p>
@@ -2393,7 +2401,7 @@
           <a:p>
             <a:fld id="{EAA3A8BB-77FD-4B0C-9729-5723AE9AFB2D}" type="datetimeFigureOut">
               <a:rPr lang="en-GB" smtClean="0"/>
-              <a:t>22/10/2024</a:t>
+              <a:t>31/10/2024</a:t>
             </a:fld>
             <a:endParaRPr lang="en-GB"/>
           </a:p>
@@ -2682,7 +2690,7 @@
           <a:p>
             <a:fld id="{EAA3A8BB-77FD-4B0C-9729-5723AE9AFB2D}" type="datetimeFigureOut">
               <a:rPr lang="en-GB" smtClean="0"/>
-              <a:t>22/10/2024</a:t>
+              <a:t>31/10/2024</a:t>
             </a:fld>
             <a:endParaRPr lang="en-GB"/>
           </a:p>
@@ -2925,7 +2933,7 @@
           <a:p>
             <a:fld id="{EAA3A8BB-77FD-4B0C-9729-5723AE9AFB2D}" type="datetimeFigureOut">
               <a:rPr lang="en-GB" smtClean="0"/>
-              <a:t>22/10/2024</a:t>
+              <a:t>31/10/2024</a:t>
             </a:fld>
             <a:endParaRPr lang="en-GB"/>
           </a:p>
@@ -3544,12 +3552,439 @@
           </a:prstGeom>
         </p:spPr>
       </p:pic>
+      <p:grpSp>
+        <p:nvGrpSpPr>
+          <p:cNvPr id="25" name="Group 24">
+            <a:extLst>
+              <a:ext uri="{FF2B5EF4-FFF2-40B4-BE49-F238E27FC236}">
+                <a16:creationId xmlns:a16="http://schemas.microsoft.com/office/drawing/2014/main" id="{235FED3D-A021-8AF5-068E-8D583C140A98}"/>
+              </a:ext>
+            </a:extLst>
+          </p:cNvPr>
+          <p:cNvGrpSpPr/>
+          <p:nvPr/>
+        </p:nvGrpSpPr>
+        <p:grpSpPr>
+          <a:xfrm>
+            <a:off x="4797205" y="3241751"/>
+            <a:ext cx="1866122" cy="1725221"/>
+            <a:chOff x="4776885" y="3231591"/>
+            <a:chExt cx="1866122" cy="1725221"/>
+          </a:xfrm>
+        </p:grpSpPr>
+        <p:sp>
+          <p:nvSpPr>
+            <p:cNvPr id="19" name="Hexagon 18">
+              <a:extLst>
+                <a:ext uri="{FF2B5EF4-FFF2-40B4-BE49-F238E27FC236}">
+                  <a16:creationId xmlns:a16="http://schemas.microsoft.com/office/drawing/2014/main" id="{F83ACC3E-186D-53E9-A23D-0F5F099C06FE}"/>
+                </a:ext>
+              </a:extLst>
+            </p:cNvPr>
+            <p:cNvSpPr/>
+            <p:nvPr/>
+          </p:nvSpPr>
+          <p:spPr>
+            <a:xfrm rot="19753724">
+              <a:off x="4776885" y="3231591"/>
+              <a:ext cx="1866122" cy="1608726"/>
+            </a:xfrm>
+            <a:prstGeom prst="hexagon">
+              <a:avLst>
+                <a:gd name="adj" fmla="val 30087"/>
+                <a:gd name="vf" fmla="val 115470"/>
+              </a:avLst>
+            </a:prstGeom>
+            <a:ln w="38100"/>
+          </p:spPr>
+          <p:style>
+            <a:lnRef idx="2">
+              <a:schemeClr val="dk1"/>
+            </a:lnRef>
+            <a:fillRef idx="1">
+              <a:schemeClr val="lt1"/>
+            </a:fillRef>
+            <a:effectRef idx="0">
+              <a:schemeClr val="dk1"/>
+            </a:effectRef>
+            <a:fontRef idx="minor">
+              <a:schemeClr val="dk1"/>
+            </a:fontRef>
+          </p:style>
+          <p:txBody>
+            <a:bodyPr rtlCol="0" anchor="ctr"/>
+            <a:lstStyle/>
+            <a:p>
+              <a:pPr algn="ctr"/>
+              <a:endParaRPr lang="en-GB"/>
+            </a:p>
+          </p:txBody>
+        </p:sp>
+        <p:cxnSp>
+          <p:nvCxnSpPr>
+            <p:cNvPr id="21" name="Straight Connector 20">
+              <a:extLst>
+                <a:ext uri="{FF2B5EF4-FFF2-40B4-BE49-F238E27FC236}">
+                  <a16:creationId xmlns:a16="http://schemas.microsoft.com/office/drawing/2014/main" id="{8DD59BCE-39C0-4365-3124-F00EAC8F40FF}"/>
+                </a:ext>
+              </a:extLst>
+            </p:cNvPr>
+            <p:cNvCxnSpPr>
+              <a:cxnSpLocks/>
+              <a:stCxn id="19" idx="4"/>
+            </p:cNvCxnSpPr>
+            <p:nvPr/>
+          </p:nvCxnSpPr>
+          <p:spPr>
+            <a:xfrm>
+              <a:off x="4912598" y="3574568"/>
+              <a:ext cx="821452" cy="517372"/>
+            </a:xfrm>
+            <a:prstGeom prst="line">
+              <a:avLst/>
+            </a:prstGeom>
+            <a:ln w="38100"/>
+          </p:spPr>
+          <p:style>
+            <a:lnRef idx="1">
+              <a:schemeClr val="dk1"/>
+            </a:lnRef>
+            <a:fillRef idx="0">
+              <a:schemeClr val="dk1"/>
+            </a:fillRef>
+            <a:effectRef idx="0">
+              <a:schemeClr val="dk1"/>
+            </a:effectRef>
+            <a:fontRef idx="minor">
+              <a:schemeClr val="tx1"/>
+            </a:fontRef>
+          </p:style>
+        </p:cxnSp>
+        <p:cxnSp>
+          <p:nvCxnSpPr>
+            <p:cNvPr id="22" name="Straight Connector 21">
+              <a:extLst>
+                <a:ext uri="{FF2B5EF4-FFF2-40B4-BE49-F238E27FC236}">
+                  <a16:creationId xmlns:a16="http://schemas.microsoft.com/office/drawing/2014/main" id="{A99CCBAD-5326-673A-E25C-F228AB800EC0}"/>
+                </a:ext>
+              </a:extLst>
+            </p:cNvPr>
+            <p:cNvCxnSpPr>
+              <a:cxnSpLocks/>
+              <a:endCxn id="19" idx="2"/>
+            </p:cNvCxnSpPr>
+            <p:nvPr/>
+          </p:nvCxnSpPr>
+          <p:spPr>
+            <a:xfrm>
+              <a:off x="5735642" y="4091940"/>
+              <a:ext cx="0" cy="864872"/>
+            </a:xfrm>
+            <a:prstGeom prst="line">
+              <a:avLst/>
+            </a:prstGeom>
+            <a:ln w="38100"/>
+          </p:spPr>
+          <p:style>
+            <a:lnRef idx="1">
+              <a:schemeClr val="dk1"/>
+            </a:lnRef>
+            <a:fillRef idx="0">
+              <a:schemeClr val="dk1"/>
+            </a:fillRef>
+            <a:effectRef idx="0">
+              <a:schemeClr val="dk1"/>
+            </a:effectRef>
+            <a:fontRef idx="minor">
+              <a:schemeClr val="tx1"/>
+            </a:fontRef>
+          </p:style>
+        </p:cxnSp>
+        <p:cxnSp>
+          <p:nvCxnSpPr>
+            <p:cNvPr id="23" name="Straight Connector 22">
+              <a:extLst>
+                <a:ext uri="{FF2B5EF4-FFF2-40B4-BE49-F238E27FC236}">
+                  <a16:creationId xmlns:a16="http://schemas.microsoft.com/office/drawing/2014/main" id="{F30BCC3F-63B6-FC83-B6B1-655F4B5EBD0E}"/>
+                </a:ext>
+              </a:extLst>
+            </p:cNvPr>
+            <p:cNvCxnSpPr>
+              <a:cxnSpLocks/>
+              <a:endCxn id="19" idx="0"/>
+            </p:cNvCxnSpPr>
+            <p:nvPr/>
+          </p:nvCxnSpPr>
+          <p:spPr>
+            <a:xfrm flipV="1">
+              <a:off x="5730240" y="3558589"/>
+              <a:ext cx="781407" cy="533351"/>
+            </a:xfrm>
+            <a:prstGeom prst="line">
+              <a:avLst/>
+            </a:prstGeom>
+            <a:ln w="38100"/>
+          </p:spPr>
+          <p:style>
+            <a:lnRef idx="1">
+              <a:schemeClr val="dk1"/>
+            </a:lnRef>
+            <a:fillRef idx="0">
+              <a:schemeClr val="dk1"/>
+            </a:fillRef>
+            <a:effectRef idx="0">
+              <a:schemeClr val="dk1"/>
+            </a:effectRef>
+            <a:fontRef idx="minor">
+              <a:schemeClr val="tx1"/>
+            </a:fontRef>
+          </p:style>
+        </p:cxnSp>
+      </p:grpSp>
+    </p:spTree>
+    <p:extLst>
+      <p:ext uri="{BB962C8B-B14F-4D97-AF65-F5344CB8AC3E}">
+        <p14:creationId xmlns:p14="http://schemas.microsoft.com/office/powerpoint/2010/main" val="3885969909"/>
+      </p:ext>
+    </p:extLst>
+  </p:cSld>
+  <p:clrMapOvr>
+    <a:masterClrMapping/>
+  </p:clrMapOvr>
+</p:sld>
+</file>
+
+<file path=ppt/slides/slide2.xml><?xml version="1.0" encoding="utf-8"?>
+<p:sld xmlns:a="http://schemas.openxmlformats.org/drawingml/2006/main" xmlns:r="http://schemas.openxmlformats.org/officeDocument/2006/relationships" xmlns:p="http://schemas.openxmlformats.org/presentationml/2006/main">
+  <p:cSld>
+    <p:spTree>
+      <p:nvGrpSpPr>
+        <p:cNvPr id="1" name="">
+          <a:extLst>
+            <a:ext uri="{FF2B5EF4-FFF2-40B4-BE49-F238E27FC236}">
+              <a16:creationId xmlns:a16="http://schemas.microsoft.com/office/drawing/2014/main" id="{B888C72B-B9B8-CDC3-E8D8-02A4E5CC1222}"/>
+            </a:ext>
+          </a:extLst>
+        </p:cNvPr>
+        <p:cNvGrpSpPr/>
+        <p:nvPr/>
+      </p:nvGrpSpPr>
+      <p:grpSpPr>
+        <a:xfrm>
+          <a:off x="0" y="0"/>
+          <a:ext cx="0" cy="0"/>
+          <a:chOff x="0" y="0"/>
+          <a:chExt cx="0" cy="0"/>
+        </a:xfrm>
+      </p:grpSpPr>
+      <p:pic>
+        <p:nvPicPr>
+          <p:cNvPr id="17" name="Picture 2">
+            <a:extLst>
+              <a:ext uri="{FF2B5EF4-FFF2-40B4-BE49-F238E27FC236}">
+                <a16:creationId xmlns:a16="http://schemas.microsoft.com/office/drawing/2014/main" id="{69CF983B-0A10-83C3-F023-B8AD660867E3}"/>
+              </a:ext>
+            </a:extLst>
+          </p:cNvPr>
+          <p:cNvPicPr>
+            <a:picLocks noChangeAspect="1" noChangeArrowheads="1"/>
+          </p:cNvPicPr>
+          <p:nvPr/>
+        </p:nvPicPr>
+        <p:blipFill>
+          <a:blip r:embed="rId2">
+            <a:extLst>
+              <a:ext uri="{28A0092B-C50C-407E-A947-70E740481C1C}">
+                <a14:useLocalDpi xmlns:a14="http://schemas.microsoft.com/office/drawing/2010/main" val="0"/>
+              </a:ext>
+            </a:extLst>
+          </a:blip>
+          <a:srcRect/>
+          <a:stretch>
+            <a:fillRect/>
+          </a:stretch>
+        </p:blipFill>
+        <p:spPr bwMode="auto">
+          <a:xfrm>
+            <a:off x="2037185" y="80343"/>
+            <a:ext cx="7340080" cy="7095410"/>
+          </a:xfrm>
+          <a:prstGeom prst="rect">
+            <a:avLst/>
+          </a:prstGeom>
+          <a:noFill/>
+          <a:extLst>
+            <a:ext uri="{909E8E84-426E-40DD-AFC4-6F175D3DCCD1}">
+              <a14:hiddenFill xmlns:a14="http://schemas.microsoft.com/office/drawing/2010/main">
+                <a:solidFill>
+                  <a:srgbClr val="FFFFFF"/>
+                </a:solidFill>
+              </a14:hiddenFill>
+            </a:ext>
+          </a:extLst>
+        </p:spPr>
+      </p:pic>
+      <p:pic>
+        <p:nvPicPr>
+          <p:cNvPr id="1026" name="Picture 2">
+            <a:extLst>
+              <a:ext uri="{FF2B5EF4-FFF2-40B4-BE49-F238E27FC236}">
+                <a16:creationId xmlns:a16="http://schemas.microsoft.com/office/drawing/2014/main" id="{CFE9C3F2-FF4D-141D-3804-911E8B7F5E8A}"/>
+              </a:ext>
+            </a:extLst>
+          </p:cNvPr>
+          <p:cNvPicPr>
+            <a:picLocks noChangeAspect="1" noChangeArrowheads="1"/>
+          </p:cNvPicPr>
+          <p:nvPr/>
+        </p:nvPicPr>
+        <p:blipFill>
+          <a:blip r:embed="rId2">
+            <a:extLst>
+              <a:ext uri="{28A0092B-C50C-407E-A947-70E740481C1C}">
+                <a14:useLocalDpi xmlns:a14="http://schemas.microsoft.com/office/drawing/2010/main" val="0"/>
+              </a:ext>
+            </a:extLst>
+          </a:blip>
+          <a:srcRect/>
+          <a:stretch>
+            <a:fillRect/>
+          </a:stretch>
+        </p:blipFill>
+        <p:spPr bwMode="auto">
+          <a:xfrm>
+            <a:off x="2275115" y="319573"/>
+            <a:ext cx="6858000" cy="6629400"/>
+          </a:xfrm>
+          <a:prstGeom prst="rect">
+            <a:avLst/>
+          </a:prstGeom>
+          <a:noFill/>
+          <a:extLst>
+            <a:ext uri="{909E8E84-426E-40DD-AFC4-6F175D3DCCD1}">
+              <a14:hiddenFill xmlns:a14="http://schemas.microsoft.com/office/drawing/2010/main">
+                <a:solidFill>
+                  <a:srgbClr val="FFFFFF"/>
+                </a:solidFill>
+              </a14:hiddenFill>
+            </a:ext>
+          </a:extLst>
+        </p:spPr>
+      </p:pic>
+      <p:pic>
+        <p:nvPicPr>
+          <p:cNvPr id="9" name="Graphic 8" descr="Single gear">
+            <a:extLst>
+              <a:ext uri="{FF2B5EF4-FFF2-40B4-BE49-F238E27FC236}">
+                <a16:creationId xmlns:a16="http://schemas.microsoft.com/office/drawing/2014/main" id="{ED66BA7E-5435-AF00-3D5E-023B574826FD}"/>
+              </a:ext>
+            </a:extLst>
+          </p:cNvPr>
+          <p:cNvPicPr>
+            <a:picLocks noChangeAspect="1"/>
+          </p:cNvPicPr>
+          <p:nvPr/>
+        </p:nvPicPr>
+        <p:blipFill>
+          <a:blip r:embed="rId3">
+            <a:extLst>
+              <a:ext uri="{96DAC541-7B7A-43D3-8B79-37D633B846F1}">
+                <asvg:svgBlip xmlns:asvg="http://schemas.microsoft.com/office/drawing/2016/SVG/main" r:embed="rId4"/>
+              </a:ext>
+            </a:extLst>
+          </a:blip>
+          <a:stretch>
+            <a:fillRect/>
+          </a:stretch>
+        </p:blipFill>
+        <p:spPr>
+          <a:xfrm rot="21285712">
+            <a:off x="2264228" y="3432111"/>
+            <a:ext cx="3259494" cy="3259494"/>
+          </a:xfrm>
+          <a:prstGeom prst="rect">
+            <a:avLst/>
+          </a:prstGeom>
+        </p:spPr>
+      </p:pic>
+      <p:pic>
+        <p:nvPicPr>
+          <p:cNvPr id="10" name="Graphic 9" descr="Single gear">
+            <a:extLst>
+              <a:ext uri="{FF2B5EF4-FFF2-40B4-BE49-F238E27FC236}">
+                <a16:creationId xmlns:a16="http://schemas.microsoft.com/office/drawing/2014/main" id="{B62CE187-CBA3-FCDD-9704-691332D66F58}"/>
+              </a:ext>
+            </a:extLst>
+          </p:cNvPr>
+          <p:cNvPicPr>
+            <a:picLocks noChangeAspect="1"/>
+          </p:cNvPicPr>
+          <p:nvPr/>
+        </p:nvPicPr>
+        <p:blipFill>
+          <a:blip r:embed="rId3">
+            <a:extLst>
+              <a:ext uri="{96DAC541-7B7A-43D3-8B79-37D633B846F1}">
+                <asvg:svgBlip xmlns:asvg="http://schemas.microsoft.com/office/drawing/2016/SVG/main" r:embed="rId4"/>
+              </a:ext>
+            </a:extLst>
+          </a:blip>
+          <a:stretch>
+            <a:fillRect/>
+          </a:stretch>
+        </p:blipFill>
+        <p:spPr>
+          <a:xfrm rot="344198">
+            <a:off x="5896948" y="3444553"/>
+            <a:ext cx="3259494" cy="3259494"/>
+          </a:xfrm>
+          <a:prstGeom prst="rect">
+            <a:avLst/>
+          </a:prstGeom>
+        </p:spPr>
+      </p:pic>
+      <p:pic>
+        <p:nvPicPr>
+          <p:cNvPr id="11" name="Graphic 10" descr="Single gear">
+            <a:extLst>
+              <a:ext uri="{FF2B5EF4-FFF2-40B4-BE49-F238E27FC236}">
+                <a16:creationId xmlns:a16="http://schemas.microsoft.com/office/drawing/2014/main" id="{635A8C82-7DBF-6991-14D9-FFFD99916266}"/>
+              </a:ext>
+            </a:extLst>
+          </p:cNvPr>
+          <p:cNvPicPr>
+            <a:picLocks noChangeAspect="1"/>
+          </p:cNvPicPr>
+          <p:nvPr/>
+        </p:nvPicPr>
+        <p:blipFill>
+          <a:blip r:embed="rId3">
+            <a:extLst>
+              <a:ext uri="{96DAC541-7B7A-43D3-8B79-37D633B846F1}">
+                <asvg:svgBlip xmlns:asvg="http://schemas.microsoft.com/office/drawing/2016/SVG/main" r:embed="rId4"/>
+              </a:ext>
+            </a:extLst>
+          </a:blip>
+          <a:stretch>
+            <a:fillRect/>
+          </a:stretch>
+        </p:blipFill>
+        <p:spPr>
+          <a:xfrm rot="1367425">
+            <a:off x="4099249" y="265925"/>
+            <a:ext cx="3259494" cy="3259494"/>
+          </a:xfrm>
+          <a:prstGeom prst="rect">
+            <a:avLst/>
+          </a:prstGeom>
+        </p:spPr>
+      </p:pic>
       <p:sp>
         <p:nvSpPr>
           <p:cNvPr id="15" name="Hexagon 14">
             <a:extLst>
               <a:ext uri="{FF2B5EF4-FFF2-40B4-BE49-F238E27FC236}">
-                <a16:creationId xmlns:a16="http://schemas.microsoft.com/office/drawing/2014/main" id="{69E79F0F-7EF7-C838-4B06-61B472960BCF}"/>
+                <a16:creationId xmlns:a16="http://schemas.microsoft.com/office/drawing/2014/main" id="{542530E0-0F69-85A1-8DEC-6CCE135670E5}"/>
               </a:ext>
             </a:extLst>
           </p:cNvPr>
@@ -3557,8 +3992,8 @@
           <p:nvPr/>
         </p:nvSpPr>
         <p:spPr>
-          <a:xfrm rot="19900487">
-            <a:off x="4795935" y="3254451"/>
+          <a:xfrm rot="19753724">
+            <a:off x="4776885" y="3231591"/>
             <a:ext cx="1866122" cy="1608726"/>
           </a:xfrm>
           <a:prstGeom prst="hexagon">
@@ -3597,7 +4032,7 @@
           <p:cNvPr id="20" name="Straight Connector 19">
             <a:extLst>
               <a:ext uri="{FF2B5EF4-FFF2-40B4-BE49-F238E27FC236}">
-                <a16:creationId xmlns:a16="http://schemas.microsoft.com/office/drawing/2014/main" id="{C7A09E0A-B10C-09BF-BE3F-8BC3BD25BB34}"/>
+                <a16:creationId xmlns:a16="http://schemas.microsoft.com/office/drawing/2014/main" id="{7CF53E6A-27A0-DEBE-2D81-28430BEEC267}"/>
               </a:ext>
             </a:extLst>
           </p:cNvPr>
@@ -3609,8 +4044,8 @@
         </p:nvCxnSpPr>
         <p:spPr>
           <a:xfrm>
-            <a:off x="4952066" y="3563819"/>
-            <a:ext cx="784270" cy="520501"/>
+            <a:off x="4912598" y="3574568"/>
+            <a:ext cx="821452" cy="517372"/>
           </a:xfrm>
           <a:prstGeom prst="line">
             <a:avLst/>
@@ -3637,7 +4072,7 @@
           <p:cNvPr id="24" name="Straight Connector 23">
             <a:extLst>
               <a:ext uri="{FF2B5EF4-FFF2-40B4-BE49-F238E27FC236}">
-                <a16:creationId xmlns:a16="http://schemas.microsoft.com/office/drawing/2014/main" id="{97C574A0-3189-2C4C-0001-464690406D7F}"/>
+                <a16:creationId xmlns:a16="http://schemas.microsoft.com/office/drawing/2014/main" id="{35A0C722-D689-0026-AC75-FBE2FDFD1BD2}"/>
               </a:ext>
             </a:extLst>
           </p:cNvPr>
@@ -3649,8 +4084,8 @@
         </p:nvCxnSpPr>
         <p:spPr>
           <a:xfrm>
-            <a:off x="5715367" y="4072128"/>
-            <a:ext cx="0" cy="907802"/>
+            <a:off x="5735642" y="4091940"/>
+            <a:ext cx="0" cy="864872"/>
           </a:xfrm>
           <a:prstGeom prst="line">
             <a:avLst/>
@@ -3677,7 +4112,7 @@
           <p:cNvPr id="29" name="Straight Connector 28">
             <a:extLst>
               <a:ext uri="{FF2B5EF4-FFF2-40B4-BE49-F238E27FC236}">
-                <a16:creationId xmlns:a16="http://schemas.microsoft.com/office/drawing/2014/main" id="{F87E6B7C-A98C-22C4-6618-9D3F9C318BD5}"/>
+                <a16:creationId xmlns:a16="http://schemas.microsoft.com/office/drawing/2014/main" id="{F4F5EBB1-4728-4B6B-A2AA-5A2E4381860C}"/>
               </a:ext>
             </a:extLst>
           </p:cNvPr>
@@ -3689,8 +4124,8 @@
         </p:nvCxnSpPr>
         <p:spPr>
           <a:xfrm flipV="1">
-            <a:off x="5718048" y="3616099"/>
-            <a:ext cx="832292" cy="468221"/>
+            <a:off x="5730240" y="3558589"/>
+            <a:ext cx="781407" cy="533351"/>
           </a:xfrm>
           <a:prstGeom prst="line">
             <a:avLst/>
@@ -3715,7 +4150,1082 @@
     </p:spTree>
     <p:extLst>
       <p:ext uri="{BB962C8B-B14F-4D97-AF65-F5344CB8AC3E}">
-        <p14:creationId xmlns:p14="http://schemas.microsoft.com/office/powerpoint/2010/main" val="3885969909"/>
+        <p14:creationId xmlns:p14="http://schemas.microsoft.com/office/powerpoint/2010/main" val="3271899729"/>
+      </p:ext>
+    </p:extLst>
+  </p:cSld>
+  <p:clrMapOvr>
+    <a:masterClrMapping/>
+  </p:clrMapOvr>
+</p:sld>
+</file>
+
+<file path=ppt/slides/slide3.xml><?xml version="1.0" encoding="utf-8"?>
+<p:sld xmlns:a="http://schemas.openxmlformats.org/drawingml/2006/main" xmlns:r="http://schemas.openxmlformats.org/officeDocument/2006/relationships" xmlns:p="http://schemas.openxmlformats.org/presentationml/2006/main">
+  <p:cSld>
+    <p:spTree>
+      <p:nvGrpSpPr>
+        <p:cNvPr id="1" name="">
+          <a:extLst>
+            <a:ext uri="{FF2B5EF4-FFF2-40B4-BE49-F238E27FC236}">
+              <a16:creationId xmlns:a16="http://schemas.microsoft.com/office/drawing/2014/main" id="{45FAA02C-4955-D9F3-92F6-5D538F33BA0D}"/>
+            </a:ext>
+          </a:extLst>
+        </p:cNvPr>
+        <p:cNvGrpSpPr/>
+        <p:nvPr/>
+      </p:nvGrpSpPr>
+      <p:grpSpPr>
+        <a:xfrm>
+          <a:off x="0" y="0"/>
+          <a:ext cx="0" cy="0"/>
+          <a:chOff x="0" y="0"/>
+          <a:chExt cx="0" cy="0"/>
+        </a:xfrm>
+      </p:grpSpPr>
+      <p:pic>
+        <p:nvPicPr>
+          <p:cNvPr id="17" name="Picture 2">
+            <a:extLst>
+              <a:ext uri="{FF2B5EF4-FFF2-40B4-BE49-F238E27FC236}">
+                <a16:creationId xmlns:a16="http://schemas.microsoft.com/office/drawing/2014/main" id="{93095B69-E354-9A53-D0DD-FFFE41631F19}"/>
+              </a:ext>
+            </a:extLst>
+          </p:cNvPr>
+          <p:cNvPicPr>
+            <a:picLocks noChangeAspect="1" noChangeArrowheads="1"/>
+          </p:cNvPicPr>
+          <p:nvPr/>
+        </p:nvPicPr>
+        <p:blipFill>
+          <a:blip r:embed="rId2">
+            <a:extLst>
+              <a:ext uri="{28A0092B-C50C-407E-A947-70E740481C1C}">
+                <a14:useLocalDpi xmlns:a14="http://schemas.microsoft.com/office/drawing/2010/main" val="0"/>
+              </a:ext>
+            </a:extLst>
+          </a:blip>
+          <a:srcRect/>
+          <a:stretch>
+            <a:fillRect/>
+          </a:stretch>
+        </p:blipFill>
+        <p:spPr bwMode="auto">
+          <a:xfrm>
+            <a:off x="2037185" y="80343"/>
+            <a:ext cx="7340080" cy="7095410"/>
+          </a:xfrm>
+          <a:prstGeom prst="rect">
+            <a:avLst/>
+          </a:prstGeom>
+          <a:noFill/>
+          <a:extLst>
+            <a:ext uri="{909E8E84-426E-40DD-AFC4-6F175D3DCCD1}">
+              <a14:hiddenFill xmlns:a14="http://schemas.microsoft.com/office/drawing/2010/main">
+                <a:solidFill>
+                  <a:srgbClr val="FFFFFF"/>
+                </a:solidFill>
+              </a14:hiddenFill>
+            </a:ext>
+          </a:extLst>
+        </p:spPr>
+      </p:pic>
+      <p:pic>
+        <p:nvPicPr>
+          <p:cNvPr id="1026" name="Picture 2">
+            <a:extLst>
+              <a:ext uri="{FF2B5EF4-FFF2-40B4-BE49-F238E27FC236}">
+                <a16:creationId xmlns:a16="http://schemas.microsoft.com/office/drawing/2014/main" id="{9CD9AECA-5992-E471-CA0B-A2BB03DA4891}"/>
+              </a:ext>
+            </a:extLst>
+          </p:cNvPr>
+          <p:cNvPicPr>
+            <a:picLocks noChangeAspect="1" noChangeArrowheads="1"/>
+          </p:cNvPicPr>
+          <p:nvPr/>
+        </p:nvPicPr>
+        <p:blipFill>
+          <a:blip r:embed="rId2">
+            <a:extLst>
+              <a:ext uri="{28A0092B-C50C-407E-A947-70E740481C1C}">
+                <a14:useLocalDpi xmlns:a14="http://schemas.microsoft.com/office/drawing/2010/main" val="0"/>
+              </a:ext>
+            </a:extLst>
+          </a:blip>
+          <a:srcRect/>
+          <a:stretch>
+            <a:fillRect/>
+          </a:stretch>
+        </p:blipFill>
+        <p:spPr bwMode="auto">
+          <a:xfrm>
+            <a:off x="2275115" y="319573"/>
+            <a:ext cx="6858000" cy="6629400"/>
+          </a:xfrm>
+          <a:prstGeom prst="rect">
+            <a:avLst/>
+          </a:prstGeom>
+          <a:noFill/>
+          <a:extLst>
+            <a:ext uri="{909E8E84-426E-40DD-AFC4-6F175D3DCCD1}">
+              <a14:hiddenFill xmlns:a14="http://schemas.microsoft.com/office/drawing/2010/main">
+                <a:solidFill>
+                  <a:srgbClr val="FFFFFF"/>
+                </a:solidFill>
+              </a14:hiddenFill>
+            </a:ext>
+          </a:extLst>
+        </p:spPr>
+      </p:pic>
+      <p:pic>
+        <p:nvPicPr>
+          <p:cNvPr id="9" name="Graphic 8" descr="Single gear">
+            <a:extLst>
+              <a:ext uri="{FF2B5EF4-FFF2-40B4-BE49-F238E27FC236}">
+                <a16:creationId xmlns:a16="http://schemas.microsoft.com/office/drawing/2014/main" id="{C8BA64E4-5598-70F7-6769-27FEEE9E07FF}"/>
+              </a:ext>
+            </a:extLst>
+          </p:cNvPr>
+          <p:cNvPicPr>
+            <a:picLocks noChangeAspect="1"/>
+          </p:cNvPicPr>
+          <p:nvPr/>
+        </p:nvPicPr>
+        <p:blipFill>
+          <a:blip r:embed="rId3">
+            <a:extLst>
+              <a:ext uri="{96DAC541-7B7A-43D3-8B79-37D633B846F1}">
+                <asvg:svgBlip xmlns:asvg="http://schemas.microsoft.com/office/drawing/2016/SVG/main" r:embed="rId4"/>
+              </a:ext>
+            </a:extLst>
+          </a:blip>
+          <a:stretch>
+            <a:fillRect/>
+          </a:stretch>
+        </p:blipFill>
+        <p:spPr>
+          <a:xfrm rot="21285712">
+            <a:off x="2264228" y="3432111"/>
+            <a:ext cx="3259494" cy="3259494"/>
+          </a:xfrm>
+          <a:prstGeom prst="rect">
+            <a:avLst/>
+          </a:prstGeom>
+        </p:spPr>
+      </p:pic>
+      <p:pic>
+        <p:nvPicPr>
+          <p:cNvPr id="10" name="Graphic 9" descr="Single gear">
+            <a:extLst>
+              <a:ext uri="{FF2B5EF4-FFF2-40B4-BE49-F238E27FC236}">
+                <a16:creationId xmlns:a16="http://schemas.microsoft.com/office/drawing/2014/main" id="{429865E7-ADAC-2953-69AB-004E63D64121}"/>
+              </a:ext>
+            </a:extLst>
+          </p:cNvPr>
+          <p:cNvPicPr>
+            <a:picLocks noChangeAspect="1"/>
+          </p:cNvPicPr>
+          <p:nvPr/>
+        </p:nvPicPr>
+        <p:blipFill>
+          <a:blip r:embed="rId3">
+            <a:extLst>
+              <a:ext uri="{96DAC541-7B7A-43D3-8B79-37D633B846F1}">
+                <asvg:svgBlip xmlns:asvg="http://schemas.microsoft.com/office/drawing/2016/SVG/main" r:embed="rId4"/>
+              </a:ext>
+            </a:extLst>
+          </a:blip>
+          <a:stretch>
+            <a:fillRect/>
+          </a:stretch>
+        </p:blipFill>
+        <p:spPr>
+          <a:xfrm rot="344198">
+            <a:off x="5896948" y="3444553"/>
+            <a:ext cx="3259494" cy="3259494"/>
+          </a:xfrm>
+          <a:prstGeom prst="rect">
+            <a:avLst/>
+          </a:prstGeom>
+        </p:spPr>
+      </p:pic>
+      <p:pic>
+        <p:nvPicPr>
+          <p:cNvPr id="11" name="Graphic 10" descr="Single gear">
+            <a:extLst>
+              <a:ext uri="{FF2B5EF4-FFF2-40B4-BE49-F238E27FC236}">
+                <a16:creationId xmlns:a16="http://schemas.microsoft.com/office/drawing/2014/main" id="{B390B2E3-9667-F1B7-A544-4331B401906C}"/>
+              </a:ext>
+            </a:extLst>
+          </p:cNvPr>
+          <p:cNvPicPr>
+            <a:picLocks noChangeAspect="1"/>
+          </p:cNvPicPr>
+          <p:nvPr/>
+        </p:nvPicPr>
+        <p:blipFill>
+          <a:blip r:embed="rId3">
+            <a:extLst>
+              <a:ext uri="{96DAC541-7B7A-43D3-8B79-37D633B846F1}">
+                <asvg:svgBlip xmlns:asvg="http://schemas.microsoft.com/office/drawing/2016/SVG/main" r:embed="rId4"/>
+              </a:ext>
+            </a:extLst>
+          </a:blip>
+          <a:stretch>
+            <a:fillRect/>
+          </a:stretch>
+        </p:blipFill>
+        <p:spPr>
+          <a:xfrm rot="1367425">
+            <a:off x="4099249" y="265925"/>
+            <a:ext cx="3259494" cy="3259494"/>
+          </a:xfrm>
+          <a:prstGeom prst="rect">
+            <a:avLst/>
+          </a:prstGeom>
+        </p:spPr>
+      </p:pic>
+      <p:sp>
+        <p:nvSpPr>
+          <p:cNvPr id="15" name="Hexagon 14">
+            <a:extLst>
+              <a:ext uri="{FF2B5EF4-FFF2-40B4-BE49-F238E27FC236}">
+                <a16:creationId xmlns:a16="http://schemas.microsoft.com/office/drawing/2014/main" id="{30C51D7C-DC51-9F99-BC94-3CDABA61B8C8}"/>
+              </a:ext>
+            </a:extLst>
+          </p:cNvPr>
+          <p:cNvSpPr/>
+          <p:nvPr/>
+        </p:nvSpPr>
+        <p:spPr>
+          <a:xfrm rot="19753724">
+            <a:off x="4776885" y="3231591"/>
+            <a:ext cx="1866122" cy="1608726"/>
+          </a:xfrm>
+          <a:prstGeom prst="hexagon">
+            <a:avLst>
+              <a:gd name="adj" fmla="val 30087"/>
+              <a:gd name="vf" fmla="val 115470"/>
+            </a:avLst>
+          </a:prstGeom>
+          <a:ln w="38100"/>
+        </p:spPr>
+        <p:style>
+          <a:lnRef idx="2">
+            <a:schemeClr val="dk1"/>
+          </a:lnRef>
+          <a:fillRef idx="1">
+            <a:schemeClr val="lt1"/>
+          </a:fillRef>
+          <a:effectRef idx="0">
+            <a:schemeClr val="dk1"/>
+          </a:effectRef>
+          <a:fontRef idx="minor">
+            <a:schemeClr val="dk1"/>
+          </a:fontRef>
+        </p:style>
+        <p:txBody>
+          <a:bodyPr rtlCol="0" anchor="ctr"/>
+          <a:lstStyle/>
+          <a:p>
+            <a:pPr algn="ctr"/>
+            <a:endParaRPr lang="en-GB"/>
+          </a:p>
+        </p:txBody>
+      </p:sp>
+      <p:cxnSp>
+        <p:nvCxnSpPr>
+          <p:cNvPr id="20" name="Straight Connector 19">
+            <a:extLst>
+              <a:ext uri="{FF2B5EF4-FFF2-40B4-BE49-F238E27FC236}">
+                <a16:creationId xmlns:a16="http://schemas.microsoft.com/office/drawing/2014/main" id="{5196F4CC-1428-DFF4-4921-83E15842B6E7}"/>
+              </a:ext>
+            </a:extLst>
+          </p:cNvPr>
+          <p:cNvCxnSpPr>
+            <a:cxnSpLocks/>
+            <a:stCxn id="15" idx="4"/>
+          </p:cNvCxnSpPr>
+          <p:nvPr/>
+        </p:nvCxnSpPr>
+        <p:spPr>
+          <a:xfrm>
+            <a:off x="4912598" y="3574568"/>
+            <a:ext cx="821452" cy="517372"/>
+          </a:xfrm>
+          <a:prstGeom prst="line">
+            <a:avLst/>
+          </a:prstGeom>
+          <a:ln w="38100"/>
+        </p:spPr>
+        <p:style>
+          <a:lnRef idx="1">
+            <a:schemeClr val="dk1"/>
+          </a:lnRef>
+          <a:fillRef idx="0">
+            <a:schemeClr val="dk1"/>
+          </a:fillRef>
+          <a:effectRef idx="0">
+            <a:schemeClr val="dk1"/>
+          </a:effectRef>
+          <a:fontRef idx="minor">
+            <a:schemeClr val="tx1"/>
+          </a:fontRef>
+        </p:style>
+      </p:cxnSp>
+      <p:cxnSp>
+        <p:nvCxnSpPr>
+          <p:cNvPr id="24" name="Straight Connector 23">
+            <a:extLst>
+              <a:ext uri="{FF2B5EF4-FFF2-40B4-BE49-F238E27FC236}">
+                <a16:creationId xmlns:a16="http://schemas.microsoft.com/office/drawing/2014/main" id="{DAAF1A06-02A1-65C5-ACFC-0B2DADA859E2}"/>
+              </a:ext>
+            </a:extLst>
+          </p:cNvPr>
+          <p:cNvCxnSpPr>
+            <a:cxnSpLocks/>
+            <a:endCxn id="15" idx="2"/>
+          </p:cNvCxnSpPr>
+          <p:nvPr/>
+        </p:nvCxnSpPr>
+        <p:spPr>
+          <a:xfrm>
+            <a:off x="5735642" y="4091940"/>
+            <a:ext cx="0" cy="864872"/>
+          </a:xfrm>
+          <a:prstGeom prst="line">
+            <a:avLst/>
+          </a:prstGeom>
+          <a:ln w="38100"/>
+        </p:spPr>
+        <p:style>
+          <a:lnRef idx="1">
+            <a:schemeClr val="dk1"/>
+          </a:lnRef>
+          <a:fillRef idx="0">
+            <a:schemeClr val="dk1"/>
+          </a:fillRef>
+          <a:effectRef idx="0">
+            <a:schemeClr val="dk1"/>
+          </a:effectRef>
+          <a:fontRef idx="minor">
+            <a:schemeClr val="tx1"/>
+          </a:fontRef>
+        </p:style>
+      </p:cxnSp>
+      <p:cxnSp>
+        <p:nvCxnSpPr>
+          <p:cNvPr id="29" name="Straight Connector 28">
+            <a:extLst>
+              <a:ext uri="{FF2B5EF4-FFF2-40B4-BE49-F238E27FC236}">
+                <a16:creationId xmlns:a16="http://schemas.microsoft.com/office/drawing/2014/main" id="{15812D03-8E3B-B247-DE70-A5D40EA4FCD8}"/>
+              </a:ext>
+            </a:extLst>
+          </p:cNvPr>
+          <p:cNvCxnSpPr>
+            <a:cxnSpLocks/>
+            <a:endCxn id="15" idx="0"/>
+          </p:cNvCxnSpPr>
+          <p:nvPr/>
+        </p:nvCxnSpPr>
+        <p:spPr>
+          <a:xfrm flipV="1">
+            <a:off x="5730240" y="3558589"/>
+            <a:ext cx="781407" cy="533351"/>
+          </a:xfrm>
+          <a:prstGeom prst="line">
+            <a:avLst/>
+          </a:prstGeom>
+          <a:ln w="38100"/>
+        </p:spPr>
+        <p:style>
+          <a:lnRef idx="1">
+            <a:schemeClr val="dk1"/>
+          </a:lnRef>
+          <a:fillRef idx="0">
+            <a:schemeClr val="dk1"/>
+          </a:fillRef>
+          <a:effectRef idx="0">
+            <a:schemeClr val="dk1"/>
+          </a:effectRef>
+          <a:fontRef idx="minor">
+            <a:schemeClr val="tx1"/>
+          </a:fontRef>
+        </p:style>
+      </p:cxnSp>
+      <p:sp>
+        <p:nvSpPr>
+          <p:cNvPr id="2" name="Arrow: Right 1">
+            <a:extLst>
+              <a:ext uri="{FF2B5EF4-FFF2-40B4-BE49-F238E27FC236}">
+                <a16:creationId xmlns:a16="http://schemas.microsoft.com/office/drawing/2014/main" id="{0C9017A7-C25A-1864-285A-3367F1DF4BF5}"/>
+              </a:ext>
+            </a:extLst>
+          </p:cNvPr>
+          <p:cNvSpPr/>
+          <p:nvPr/>
+        </p:nvSpPr>
+        <p:spPr>
+          <a:xfrm rot="16200000">
+            <a:off x="5069997" y="5349238"/>
+            <a:ext cx="1335730" cy="625154"/>
+          </a:xfrm>
+          <a:prstGeom prst="rightArrow">
+            <a:avLst>
+              <a:gd name="adj1" fmla="val 50000"/>
+              <a:gd name="adj2" fmla="val 99569"/>
+            </a:avLst>
+          </a:prstGeom>
+        </p:spPr>
+        <p:style>
+          <a:lnRef idx="2">
+            <a:schemeClr val="dk1">
+              <a:shade val="15000"/>
+            </a:schemeClr>
+          </a:lnRef>
+          <a:fillRef idx="1">
+            <a:schemeClr val="dk1"/>
+          </a:fillRef>
+          <a:effectRef idx="0">
+            <a:schemeClr val="dk1"/>
+          </a:effectRef>
+          <a:fontRef idx="minor">
+            <a:schemeClr val="lt1"/>
+          </a:fontRef>
+        </p:style>
+        <p:txBody>
+          <a:bodyPr rtlCol="0" anchor="ctr"/>
+          <a:lstStyle/>
+          <a:p>
+            <a:pPr algn="ctr"/>
+            <a:endParaRPr lang="en-GB"/>
+          </a:p>
+        </p:txBody>
+      </p:sp>
+      <p:sp>
+        <p:nvSpPr>
+          <p:cNvPr id="3" name="Arrow: Right 2">
+            <a:extLst>
+              <a:ext uri="{FF2B5EF4-FFF2-40B4-BE49-F238E27FC236}">
+                <a16:creationId xmlns:a16="http://schemas.microsoft.com/office/drawing/2014/main" id="{F23DDBF4-F6AE-4170-6D22-E2487AF18108}"/>
+              </a:ext>
+            </a:extLst>
+          </p:cNvPr>
+          <p:cNvSpPr/>
+          <p:nvPr/>
+        </p:nvSpPr>
+        <p:spPr>
+          <a:xfrm rot="1790980">
+            <a:off x="3600967" y="2919016"/>
+            <a:ext cx="1368592" cy="625154"/>
+          </a:xfrm>
+          <a:prstGeom prst="rightArrow">
+            <a:avLst>
+              <a:gd name="adj1" fmla="val 50000"/>
+              <a:gd name="adj2" fmla="val 99569"/>
+            </a:avLst>
+          </a:prstGeom>
+        </p:spPr>
+        <p:style>
+          <a:lnRef idx="2">
+            <a:schemeClr val="dk1">
+              <a:shade val="15000"/>
+            </a:schemeClr>
+          </a:lnRef>
+          <a:fillRef idx="1">
+            <a:schemeClr val="dk1"/>
+          </a:fillRef>
+          <a:effectRef idx="0">
+            <a:schemeClr val="dk1"/>
+          </a:effectRef>
+          <a:fontRef idx="minor">
+            <a:schemeClr val="lt1"/>
+          </a:fontRef>
+        </p:style>
+        <p:txBody>
+          <a:bodyPr rtlCol="0" anchor="ctr"/>
+          <a:lstStyle/>
+          <a:p>
+            <a:pPr algn="ctr"/>
+            <a:endParaRPr lang="en-GB"/>
+          </a:p>
+        </p:txBody>
+      </p:sp>
+      <p:sp>
+        <p:nvSpPr>
+          <p:cNvPr id="8" name="Arrow: Right 7">
+            <a:extLst>
+              <a:ext uri="{FF2B5EF4-FFF2-40B4-BE49-F238E27FC236}">
+                <a16:creationId xmlns:a16="http://schemas.microsoft.com/office/drawing/2014/main" id="{2FDFC163-D19A-9356-F53A-8D051B44E7F0}"/>
+              </a:ext>
+            </a:extLst>
+          </p:cNvPr>
+          <p:cNvSpPr/>
+          <p:nvPr/>
+        </p:nvSpPr>
+        <p:spPr>
+          <a:xfrm rot="9023446">
+            <a:off x="6447312" y="2895598"/>
+            <a:ext cx="1335730" cy="625154"/>
+          </a:xfrm>
+          <a:prstGeom prst="rightArrow">
+            <a:avLst>
+              <a:gd name="adj1" fmla="val 50000"/>
+              <a:gd name="adj2" fmla="val 99569"/>
+            </a:avLst>
+          </a:prstGeom>
+        </p:spPr>
+        <p:style>
+          <a:lnRef idx="2">
+            <a:schemeClr val="dk1">
+              <a:shade val="15000"/>
+            </a:schemeClr>
+          </a:lnRef>
+          <a:fillRef idx="1">
+            <a:schemeClr val="dk1"/>
+          </a:fillRef>
+          <a:effectRef idx="0">
+            <a:schemeClr val="dk1"/>
+          </a:effectRef>
+          <a:fontRef idx="minor">
+            <a:schemeClr val="lt1"/>
+          </a:fontRef>
+        </p:style>
+        <p:txBody>
+          <a:bodyPr rtlCol="0" anchor="ctr"/>
+          <a:lstStyle/>
+          <a:p>
+            <a:pPr algn="ctr"/>
+            <a:endParaRPr lang="en-GB"/>
+          </a:p>
+        </p:txBody>
+      </p:sp>
+    </p:spTree>
+    <p:extLst>
+      <p:ext uri="{BB962C8B-B14F-4D97-AF65-F5344CB8AC3E}">
+        <p14:creationId xmlns:p14="http://schemas.microsoft.com/office/powerpoint/2010/main" val="1668123740"/>
+      </p:ext>
+    </p:extLst>
+  </p:cSld>
+  <p:clrMapOvr>
+    <a:masterClrMapping/>
+  </p:clrMapOvr>
+</p:sld>
+</file>
+
+<file path=ppt/slides/slide4.xml><?xml version="1.0" encoding="utf-8"?>
+<p:sld xmlns:a="http://schemas.openxmlformats.org/drawingml/2006/main" xmlns:r="http://schemas.openxmlformats.org/officeDocument/2006/relationships" xmlns:p="http://schemas.openxmlformats.org/presentationml/2006/main">
+  <p:cSld>
+    <p:spTree>
+      <p:nvGrpSpPr>
+        <p:cNvPr id="1" name="">
+          <a:extLst>
+            <a:ext uri="{FF2B5EF4-FFF2-40B4-BE49-F238E27FC236}">
+              <a16:creationId xmlns:a16="http://schemas.microsoft.com/office/drawing/2014/main" id="{AE9F9437-C2D8-7FC5-4767-5DEF821AF548}"/>
+            </a:ext>
+          </a:extLst>
+        </p:cNvPr>
+        <p:cNvGrpSpPr/>
+        <p:nvPr/>
+      </p:nvGrpSpPr>
+      <p:grpSpPr>
+        <a:xfrm>
+          <a:off x="0" y="0"/>
+          <a:ext cx="0" cy="0"/>
+          <a:chOff x="0" y="0"/>
+          <a:chExt cx="0" cy="0"/>
+        </a:xfrm>
+      </p:grpSpPr>
+      <p:grpSp>
+        <p:nvGrpSpPr>
+          <p:cNvPr id="3" name="Group 2">
+            <a:extLst>
+              <a:ext uri="{FF2B5EF4-FFF2-40B4-BE49-F238E27FC236}">
+                <a16:creationId xmlns:a16="http://schemas.microsoft.com/office/drawing/2014/main" id="{810F80CE-07DC-5B9E-A3B3-F40A52DDF8F6}"/>
+              </a:ext>
+            </a:extLst>
+          </p:cNvPr>
+          <p:cNvGrpSpPr/>
+          <p:nvPr/>
+        </p:nvGrpSpPr>
+        <p:grpSpPr>
+          <a:xfrm>
+            <a:off x="2037185" y="80343"/>
+            <a:ext cx="7340080" cy="7095410"/>
+            <a:chOff x="2037185" y="80343"/>
+            <a:chExt cx="7340080" cy="7095410"/>
+          </a:xfrm>
+        </p:grpSpPr>
+        <p:grpSp>
+          <p:nvGrpSpPr>
+            <p:cNvPr id="2" name="Group 1">
+              <a:extLst>
+                <a:ext uri="{FF2B5EF4-FFF2-40B4-BE49-F238E27FC236}">
+                  <a16:creationId xmlns:a16="http://schemas.microsoft.com/office/drawing/2014/main" id="{6212A2EE-7BAE-A49E-E61A-D93B7B7158C5}"/>
+                </a:ext>
+              </a:extLst>
+            </p:cNvPr>
+            <p:cNvGrpSpPr/>
+            <p:nvPr/>
+          </p:nvGrpSpPr>
+          <p:grpSpPr>
+            <a:xfrm>
+              <a:off x="2037185" y="80343"/>
+              <a:ext cx="7340080" cy="7095410"/>
+              <a:chOff x="2037185" y="80343"/>
+              <a:chExt cx="7340080" cy="7095410"/>
+            </a:xfrm>
+          </p:grpSpPr>
+          <p:pic>
+            <p:nvPicPr>
+              <p:cNvPr id="17" name="Picture 2">
+                <a:extLst>
+                  <a:ext uri="{FF2B5EF4-FFF2-40B4-BE49-F238E27FC236}">
+                    <a16:creationId xmlns:a16="http://schemas.microsoft.com/office/drawing/2014/main" id="{E3E5D1C5-26FC-7872-182E-10BDA312FB52}"/>
+                  </a:ext>
+                </a:extLst>
+              </p:cNvPr>
+              <p:cNvPicPr>
+                <a:picLocks noChangeAspect="1" noChangeArrowheads="1"/>
+              </p:cNvPicPr>
+              <p:nvPr/>
+            </p:nvPicPr>
+            <p:blipFill>
+              <a:blip r:embed="rId2">
+                <a:extLst>
+                  <a:ext uri="{28A0092B-C50C-407E-A947-70E740481C1C}">
+                    <a14:useLocalDpi xmlns:a14="http://schemas.microsoft.com/office/drawing/2010/main" val="0"/>
+                  </a:ext>
+                </a:extLst>
+              </a:blip>
+              <a:srcRect/>
+              <a:stretch>
+                <a:fillRect/>
+              </a:stretch>
+            </p:blipFill>
+            <p:spPr bwMode="auto">
+              <a:xfrm>
+                <a:off x="2037185" y="80343"/>
+                <a:ext cx="7340080" cy="7095410"/>
+              </a:xfrm>
+              <a:prstGeom prst="rect">
+                <a:avLst/>
+              </a:prstGeom>
+              <a:noFill/>
+              <a:extLst>
+                <a:ext uri="{909E8E84-426E-40DD-AFC4-6F175D3DCCD1}">
+                  <a14:hiddenFill xmlns:a14="http://schemas.microsoft.com/office/drawing/2010/main">
+                    <a:solidFill>
+                      <a:srgbClr val="FFFFFF"/>
+                    </a:solidFill>
+                  </a14:hiddenFill>
+                </a:ext>
+              </a:extLst>
+            </p:spPr>
+          </p:pic>
+          <p:pic>
+            <p:nvPicPr>
+              <p:cNvPr id="1026" name="Picture 2">
+                <a:extLst>
+                  <a:ext uri="{FF2B5EF4-FFF2-40B4-BE49-F238E27FC236}">
+                    <a16:creationId xmlns:a16="http://schemas.microsoft.com/office/drawing/2014/main" id="{A7B15A0E-81F2-C27B-5EE2-34AC5C9E526F}"/>
+                  </a:ext>
+                </a:extLst>
+              </p:cNvPr>
+              <p:cNvPicPr>
+                <a:picLocks noChangeAspect="1" noChangeArrowheads="1"/>
+              </p:cNvPicPr>
+              <p:nvPr/>
+            </p:nvPicPr>
+            <p:blipFill>
+              <a:blip r:embed="rId2">
+                <a:extLst>
+                  <a:ext uri="{28A0092B-C50C-407E-A947-70E740481C1C}">
+                    <a14:useLocalDpi xmlns:a14="http://schemas.microsoft.com/office/drawing/2010/main" val="0"/>
+                  </a:ext>
+                </a:extLst>
+              </a:blip>
+              <a:srcRect/>
+              <a:stretch>
+                <a:fillRect/>
+              </a:stretch>
+            </p:blipFill>
+            <p:spPr bwMode="auto">
+              <a:xfrm>
+                <a:off x="2275115" y="319573"/>
+                <a:ext cx="6858000" cy="6629400"/>
+              </a:xfrm>
+              <a:prstGeom prst="rect">
+                <a:avLst/>
+              </a:prstGeom>
+              <a:noFill/>
+              <a:extLst>
+                <a:ext uri="{909E8E84-426E-40DD-AFC4-6F175D3DCCD1}">
+                  <a14:hiddenFill xmlns:a14="http://schemas.microsoft.com/office/drawing/2010/main">
+                    <a:solidFill>
+                      <a:srgbClr val="FFFFFF"/>
+                    </a:solidFill>
+                  </a14:hiddenFill>
+                </a:ext>
+              </a:extLst>
+            </p:spPr>
+          </p:pic>
+          <p:pic>
+            <p:nvPicPr>
+              <p:cNvPr id="9" name="Graphic 8" descr="Single gear">
+                <a:extLst>
+                  <a:ext uri="{FF2B5EF4-FFF2-40B4-BE49-F238E27FC236}">
+                    <a16:creationId xmlns:a16="http://schemas.microsoft.com/office/drawing/2014/main" id="{41F7197B-0586-EBCD-E8C0-C3058CF67F00}"/>
+                  </a:ext>
+                </a:extLst>
+              </p:cNvPr>
+              <p:cNvPicPr>
+                <a:picLocks noChangeAspect="1"/>
+              </p:cNvPicPr>
+              <p:nvPr/>
+            </p:nvPicPr>
+            <p:blipFill>
+              <a:blip r:embed="rId3">
+                <a:extLst>
+                  <a:ext uri="{96DAC541-7B7A-43D3-8B79-37D633B846F1}">
+                    <asvg:svgBlip xmlns:asvg="http://schemas.microsoft.com/office/drawing/2016/SVG/main" r:embed="rId4"/>
+                  </a:ext>
+                </a:extLst>
+              </a:blip>
+              <a:stretch>
+                <a:fillRect/>
+              </a:stretch>
+            </p:blipFill>
+            <p:spPr>
+              <a:xfrm rot="21285712">
+                <a:off x="2264228" y="3432111"/>
+                <a:ext cx="3259494" cy="3259494"/>
+              </a:xfrm>
+              <a:prstGeom prst="rect">
+                <a:avLst/>
+              </a:prstGeom>
+            </p:spPr>
+          </p:pic>
+          <p:pic>
+            <p:nvPicPr>
+              <p:cNvPr id="10" name="Graphic 9" descr="Single gear">
+                <a:extLst>
+                  <a:ext uri="{FF2B5EF4-FFF2-40B4-BE49-F238E27FC236}">
+                    <a16:creationId xmlns:a16="http://schemas.microsoft.com/office/drawing/2014/main" id="{579E5538-672C-827F-D5A8-9219F63AD322}"/>
+                  </a:ext>
+                </a:extLst>
+              </p:cNvPr>
+              <p:cNvPicPr>
+                <a:picLocks noChangeAspect="1"/>
+              </p:cNvPicPr>
+              <p:nvPr/>
+            </p:nvPicPr>
+            <p:blipFill>
+              <a:blip r:embed="rId3">
+                <a:extLst>
+                  <a:ext uri="{96DAC541-7B7A-43D3-8B79-37D633B846F1}">
+                    <asvg:svgBlip xmlns:asvg="http://schemas.microsoft.com/office/drawing/2016/SVG/main" r:embed="rId4"/>
+                  </a:ext>
+                </a:extLst>
+              </a:blip>
+              <a:stretch>
+                <a:fillRect/>
+              </a:stretch>
+            </p:blipFill>
+            <p:spPr>
+              <a:xfrm rot="344198">
+                <a:off x="5896948" y="3444553"/>
+                <a:ext cx="3259494" cy="3259494"/>
+              </a:xfrm>
+              <a:prstGeom prst="rect">
+                <a:avLst/>
+              </a:prstGeom>
+            </p:spPr>
+          </p:pic>
+          <p:cxnSp>
+            <p:nvCxnSpPr>
+              <p:cNvPr id="20" name="Straight Connector 19">
+                <a:extLst>
+                  <a:ext uri="{FF2B5EF4-FFF2-40B4-BE49-F238E27FC236}">
+                    <a16:creationId xmlns:a16="http://schemas.microsoft.com/office/drawing/2014/main" id="{C5158D06-9275-1FEC-E450-82DE5F2570AF}"/>
+                  </a:ext>
+                </a:extLst>
+              </p:cNvPr>
+              <p:cNvCxnSpPr>
+                <a:cxnSpLocks/>
+              </p:cNvCxnSpPr>
+              <p:nvPr/>
+            </p:nvCxnSpPr>
+            <p:spPr>
+              <a:xfrm>
+                <a:off x="4952066" y="3563819"/>
+                <a:ext cx="784270" cy="520501"/>
+              </a:xfrm>
+              <a:prstGeom prst="line">
+                <a:avLst/>
+              </a:prstGeom>
+              <a:ln w="38100"/>
+            </p:spPr>
+            <p:style>
+              <a:lnRef idx="1">
+                <a:schemeClr val="dk1"/>
+              </a:lnRef>
+              <a:fillRef idx="0">
+                <a:schemeClr val="dk1"/>
+              </a:fillRef>
+              <a:effectRef idx="0">
+                <a:schemeClr val="dk1"/>
+              </a:effectRef>
+              <a:fontRef idx="minor">
+                <a:schemeClr val="tx1"/>
+              </a:fontRef>
+            </p:style>
+          </p:cxnSp>
+        </p:grpSp>
+        <p:pic>
+          <p:nvPicPr>
+            <p:cNvPr id="11" name="Graphic 10" descr="Single gear">
+              <a:extLst>
+                <a:ext uri="{FF2B5EF4-FFF2-40B4-BE49-F238E27FC236}">
+                  <a16:creationId xmlns:a16="http://schemas.microsoft.com/office/drawing/2014/main" id="{64200A42-25D5-A5F3-D874-02153CC43285}"/>
+                </a:ext>
+              </a:extLst>
+            </p:cNvPr>
+            <p:cNvPicPr>
+              <a:picLocks noChangeAspect="1"/>
+            </p:cNvPicPr>
+            <p:nvPr/>
+          </p:nvPicPr>
+          <p:blipFill>
+            <a:blip r:embed="rId3">
+              <a:extLst>
+                <a:ext uri="{96DAC541-7B7A-43D3-8B79-37D633B846F1}">
+                  <asvg:svgBlip xmlns:asvg="http://schemas.microsoft.com/office/drawing/2016/SVG/main" r:embed="rId4"/>
+                </a:ext>
+              </a:extLst>
+            </a:blip>
+            <a:stretch>
+              <a:fillRect/>
+            </a:stretch>
+          </p:blipFill>
+          <p:spPr>
+            <a:xfrm rot="1367425">
+              <a:off x="4099249" y="265925"/>
+              <a:ext cx="3259494" cy="3259494"/>
+            </a:xfrm>
+            <a:prstGeom prst="rect">
+              <a:avLst/>
+            </a:prstGeom>
+          </p:spPr>
+        </p:pic>
+      </p:grpSp>
+      <p:sp>
+        <p:nvSpPr>
+          <p:cNvPr id="4" name="TextBox 3">
+            <a:extLst>
+              <a:ext uri="{FF2B5EF4-FFF2-40B4-BE49-F238E27FC236}">
+                <a16:creationId xmlns:a16="http://schemas.microsoft.com/office/drawing/2014/main" id="{18952E93-CB17-7F5D-FCE5-E8BE5CC7F063}"/>
+              </a:ext>
+            </a:extLst>
+          </p:cNvPr>
+          <p:cNvSpPr txBox="1"/>
+          <p:nvPr/>
+        </p:nvSpPr>
+        <p:spPr>
+          <a:xfrm>
+            <a:off x="162046" y="162045"/>
+            <a:ext cx="1307939" cy="923330"/>
+          </a:xfrm>
+          <a:prstGeom prst="rect">
+            <a:avLst/>
+          </a:prstGeom>
+          <a:noFill/>
+        </p:spPr>
+        <p:txBody>
+          <a:bodyPr wrap="square" rtlCol="0">
+            <a:spAutoFit/>
+          </a:bodyPr>
+          <a:lstStyle/>
+          <a:p>
+            <a:r>
+              <a:rPr lang="en-GB" dirty="0"/>
+              <a:t>GDP1 Mission Patch V1</a:t>
+            </a:r>
+          </a:p>
+        </p:txBody>
+      </p:sp>
+      <p:sp>
+        <p:nvSpPr>
+          <p:cNvPr id="5" name="Hexagon 4">
+            <a:extLst>
+              <a:ext uri="{FF2B5EF4-FFF2-40B4-BE49-F238E27FC236}">
+                <a16:creationId xmlns:a16="http://schemas.microsoft.com/office/drawing/2014/main" id="{2F0E6E90-D1DD-E97C-18BB-D6A2DD776AD7}"/>
+              </a:ext>
+            </a:extLst>
+          </p:cNvPr>
+          <p:cNvSpPr/>
+          <p:nvPr/>
+        </p:nvSpPr>
+        <p:spPr>
+          <a:xfrm rot="19753724">
+            <a:off x="4776885" y="3231591"/>
+            <a:ext cx="1866122" cy="1608726"/>
+          </a:xfrm>
+          <a:prstGeom prst="hexagon">
+            <a:avLst>
+              <a:gd name="adj" fmla="val 30087"/>
+              <a:gd name="vf" fmla="val 115470"/>
+            </a:avLst>
+          </a:prstGeom>
+          <a:ln w="38100"/>
+        </p:spPr>
+        <p:style>
+          <a:lnRef idx="2">
+            <a:schemeClr val="dk1"/>
+          </a:lnRef>
+          <a:fillRef idx="1">
+            <a:schemeClr val="lt1"/>
+          </a:fillRef>
+          <a:effectRef idx="0">
+            <a:schemeClr val="dk1"/>
+          </a:effectRef>
+          <a:fontRef idx="minor">
+            <a:schemeClr val="dk1"/>
+          </a:fontRef>
+        </p:style>
+        <p:txBody>
+          <a:bodyPr rtlCol="0" anchor="ctr"/>
+          <a:lstStyle/>
+          <a:p>
+            <a:pPr algn="ctr"/>
+            <a:endParaRPr lang="en-GB"/>
+          </a:p>
+        </p:txBody>
+      </p:sp>
+      <p:cxnSp>
+        <p:nvCxnSpPr>
+          <p:cNvPr id="6" name="Straight Connector 5">
+            <a:extLst>
+              <a:ext uri="{FF2B5EF4-FFF2-40B4-BE49-F238E27FC236}">
+                <a16:creationId xmlns:a16="http://schemas.microsoft.com/office/drawing/2014/main" id="{FBBD403E-A9C7-5009-BF79-CA59A8D65AB3}"/>
+              </a:ext>
+            </a:extLst>
+          </p:cNvPr>
+          <p:cNvCxnSpPr>
+            <a:cxnSpLocks/>
+            <a:stCxn id="5" idx="4"/>
+          </p:cNvCxnSpPr>
+          <p:nvPr/>
+        </p:nvCxnSpPr>
+        <p:spPr>
+          <a:xfrm>
+            <a:off x="4912598" y="3574568"/>
+            <a:ext cx="821452" cy="517372"/>
+          </a:xfrm>
+          <a:prstGeom prst="line">
+            <a:avLst/>
+          </a:prstGeom>
+          <a:ln w="38100"/>
+        </p:spPr>
+        <p:style>
+          <a:lnRef idx="1">
+            <a:schemeClr val="dk1"/>
+          </a:lnRef>
+          <a:fillRef idx="0">
+            <a:schemeClr val="dk1"/>
+          </a:fillRef>
+          <a:effectRef idx="0">
+            <a:schemeClr val="dk1"/>
+          </a:effectRef>
+          <a:fontRef idx="minor">
+            <a:schemeClr val="tx1"/>
+          </a:fontRef>
+        </p:style>
+      </p:cxnSp>
+      <p:cxnSp>
+        <p:nvCxnSpPr>
+          <p:cNvPr id="7" name="Straight Connector 6">
+            <a:extLst>
+              <a:ext uri="{FF2B5EF4-FFF2-40B4-BE49-F238E27FC236}">
+                <a16:creationId xmlns:a16="http://schemas.microsoft.com/office/drawing/2014/main" id="{9E95BB92-CC9A-1C79-A2C7-132EE21CC96D}"/>
+              </a:ext>
+            </a:extLst>
+          </p:cNvPr>
+          <p:cNvCxnSpPr>
+            <a:cxnSpLocks/>
+            <a:endCxn id="5" idx="2"/>
+          </p:cNvCxnSpPr>
+          <p:nvPr/>
+        </p:nvCxnSpPr>
+        <p:spPr>
+          <a:xfrm>
+            <a:off x="5735642" y="4091940"/>
+            <a:ext cx="0" cy="864872"/>
+          </a:xfrm>
+          <a:prstGeom prst="line">
+            <a:avLst/>
+          </a:prstGeom>
+          <a:ln w="38100"/>
+        </p:spPr>
+        <p:style>
+          <a:lnRef idx="1">
+            <a:schemeClr val="dk1"/>
+          </a:lnRef>
+          <a:fillRef idx="0">
+            <a:schemeClr val="dk1"/>
+          </a:fillRef>
+          <a:effectRef idx="0">
+            <a:schemeClr val="dk1"/>
+          </a:effectRef>
+          <a:fontRef idx="minor">
+            <a:schemeClr val="tx1"/>
+          </a:fontRef>
+        </p:style>
+      </p:cxnSp>
+      <p:cxnSp>
+        <p:nvCxnSpPr>
+          <p:cNvPr id="8" name="Straight Connector 7">
+            <a:extLst>
+              <a:ext uri="{FF2B5EF4-FFF2-40B4-BE49-F238E27FC236}">
+                <a16:creationId xmlns:a16="http://schemas.microsoft.com/office/drawing/2014/main" id="{223C60D0-C64D-ABC4-965F-99746BE1B206}"/>
+              </a:ext>
+            </a:extLst>
+          </p:cNvPr>
+          <p:cNvCxnSpPr>
+            <a:cxnSpLocks/>
+            <a:endCxn id="5" idx="0"/>
+          </p:cNvCxnSpPr>
+          <p:nvPr/>
+        </p:nvCxnSpPr>
+        <p:spPr>
+          <a:xfrm flipV="1">
+            <a:off x="5730240" y="3558589"/>
+            <a:ext cx="781407" cy="533351"/>
+          </a:xfrm>
+          <a:prstGeom prst="line">
+            <a:avLst/>
+          </a:prstGeom>
+          <a:ln w="38100"/>
+        </p:spPr>
+        <p:style>
+          <a:lnRef idx="1">
+            <a:schemeClr val="dk1"/>
+          </a:lnRef>
+          <a:fillRef idx="0">
+            <a:schemeClr val="dk1"/>
+          </a:fillRef>
+          <a:effectRef idx="0">
+            <a:schemeClr val="dk1"/>
+          </a:effectRef>
+          <a:fontRef idx="minor">
+            <a:schemeClr val="tx1"/>
+          </a:fontRef>
+        </p:style>
+      </p:cxnSp>
+    </p:spTree>
+    <p:extLst>
+      <p:ext uri="{BB962C8B-B14F-4D97-AF65-F5344CB8AC3E}">
+        <p14:creationId xmlns:p14="http://schemas.microsoft.com/office/powerpoint/2010/main" val="4202184848"/>
       </p:ext>
     </p:extLst>
   </p:cSld>

</xml_diff>